<commit_message>
Updated figures and scripts to generate them
</commit_message>
<xml_diff>
--- a/PotentialPaperFigures/DemModelsFigure.pptx
+++ b/PotentialPaperFigures/DemModelsFigure.pptx
@@ -286,7 +286,7 @@
           <a:lstStyle/>
           <a:p>
             <a:fld id="{CCFC08D4-7C59-7242-9DBD-1BEFF16B1B8E}" type="datetimeFigureOut">
-              <a:t>3/23/17</a:t>
+              <a:t>7/13/18</a:t>
             </a:fld>
             <a:endParaRPr lang="en-US"/>
           </a:p>
@@ -452,7 +452,7 @@
           <a:lstStyle/>
           <a:p>
             <a:fld id="{CCFC08D4-7C59-7242-9DBD-1BEFF16B1B8E}" type="datetimeFigureOut">
-              <a:t>3/23/17</a:t>
+              <a:t>7/13/18</a:t>
             </a:fld>
             <a:endParaRPr lang="en-US"/>
           </a:p>
@@ -628,7 +628,7 @@
           <a:lstStyle/>
           <a:p>
             <a:fld id="{CCFC08D4-7C59-7242-9DBD-1BEFF16B1B8E}" type="datetimeFigureOut">
-              <a:t>3/23/17</a:t>
+              <a:t>7/13/18</a:t>
             </a:fld>
             <a:endParaRPr lang="en-US"/>
           </a:p>
@@ -794,7 +794,7 @@
           <a:lstStyle/>
           <a:p>
             <a:fld id="{CCFC08D4-7C59-7242-9DBD-1BEFF16B1B8E}" type="datetimeFigureOut">
-              <a:t>3/23/17</a:t>
+              <a:t>7/13/18</a:t>
             </a:fld>
             <a:endParaRPr lang="en-US"/>
           </a:p>
@@ -1037,7 +1037,7 @@
           <a:lstStyle/>
           <a:p>
             <a:fld id="{CCFC08D4-7C59-7242-9DBD-1BEFF16B1B8E}" type="datetimeFigureOut">
-              <a:t>3/23/17</a:t>
+              <a:t>7/13/18</a:t>
             </a:fld>
             <a:endParaRPr lang="en-US"/>
           </a:p>
@@ -1320,7 +1320,7 @@
           <a:lstStyle/>
           <a:p>
             <a:fld id="{CCFC08D4-7C59-7242-9DBD-1BEFF16B1B8E}" type="datetimeFigureOut">
-              <a:t>3/23/17</a:t>
+              <a:t>7/13/18</a:t>
             </a:fld>
             <a:endParaRPr lang="en-US"/>
           </a:p>
@@ -1737,7 +1737,7 @@
           <a:lstStyle/>
           <a:p>
             <a:fld id="{CCFC08D4-7C59-7242-9DBD-1BEFF16B1B8E}" type="datetimeFigureOut">
-              <a:t>3/23/17</a:t>
+              <a:t>7/13/18</a:t>
             </a:fld>
             <a:endParaRPr lang="en-US"/>
           </a:p>
@@ -1852,7 +1852,7 @@
           <a:lstStyle/>
           <a:p>
             <a:fld id="{CCFC08D4-7C59-7242-9DBD-1BEFF16B1B8E}" type="datetimeFigureOut">
-              <a:t>3/23/17</a:t>
+              <a:t>7/13/18</a:t>
             </a:fld>
             <a:endParaRPr lang="en-US"/>
           </a:p>
@@ -1945,7 +1945,7 @@
           <a:lstStyle/>
           <a:p>
             <a:fld id="{CCFC08D4-7C59-7242-9DBD-1BEFF16B1B8E}" type="datetimeFigureOut">
-              <a:t>3/23/17</a:t>
+              <a:t>7/13/18</a:t>
             </a:fld>
             <a:endParaRPr lang="en-US"/>
           </a:p>
@@ -2218,7 +2218,7 @@
           <a:lstStyle/>
           <a:p>
             <a:fld id="{CCFC08D4-7C59-7242-9DBD-1BEFF16B1B8E}" type="datetimeFigureOut">
-              <a:t>3/23/17</a:t>
+              <a:t>7/13/18</a:t>
             </a:fld>
             <a:endParaRPr lang="en-US"/>
           </a:p>
@@ -2468,7 +2468,7 @@
           <a:lstStyle/>
           <a:p>
             <a:fld id="{CCFC08D4-7C59-7242-9DBD-1BEFF16B1B8E}" type="datetimeFigureOut">
-              <a:t>3/23/17</a:t>
+              <a:t>7/13/18</a:t>
             </a:fld>
             <a:endParaRPr lang="en-US"/>
           </a:p>
@@ -2677,7 +2677,7 @@
           </a:lstStyle>
           <a:p>
             <a:fld id="{CCFC08D4-7C59-7242-9DBD-1BEFF16B1B8E}" type="datetimeFigureOut">
-              <a:t>3/23/17</a:t>
+              <a:t>7/13/18</a:t>
             </a:fld>
             <a:endParaRPr lang="en-US"/>
           </a:p>
@@ -5115,7 +5115,7 @@
       </p:sp>
       <p:pic>
         <p:nvPicPr>
-          <p:cNvPr id="26" name="Picture 25"/>
+          <p:cNvPr id="10" name="Picture 9"/>
           <p:cNvPicPr>
             <a:picLocks noChangeAspect="1"/>
           </p:cNvPicPr>
@@ -5129,8 +5129,8 @@
         </p:blipFill>
         <p:spPr>
           <a:xfrm>
-            <a:off x="1042700" y="5854605"/>
-            <a:ext cx="4746535" cy="2758816"/>
+            <a:off x="1298360" y="5733299"/>
+            <a:ext cx="4114619" cy="2491273"/>
           </a:xfrm>
           <a:prstGeom prst="rect">
             <a:avLst/>

</xml_diff>

<commit_message>
Updated figures and analysis for Revision #1
</commit_message>
<xml_diff>
--- a/PotentialPaperFigures/DemModelsFigure.pptx
+++ b/PotentialPaperFigures/DemModelsFigure.pptx
@@ -105,6 +105,22 @@
       </a:defRPr>
     </a:lvl9pPr>
   </p:defaultTextStyle>
+  <p:extLst>
+    <p:ext uri="{EFAFB233-063F-42B5-8137-9DF3F51BA10A}">
+      <p15:sldGuideLst xmlns:p15="http://schemas.microsoft.com/office/powerpoint/2012/main">
+        <p15:guide id="1" orient="horz" pos="2880">
+          <p15:clr>
+            <a:srgbClr val="A4A3A4"/>
+          </p15:clr>
+        </p15:guide>
+        <p15:guide id="2" pos="2160">
+          <p15:clr>
+            <a:srgbClr val="A4A3A4"/>
+          </p15:clr>
+        </p15:guide>
+      </p15:sldGuideLst>
+    </p:ext>
+  </p:extLst>
 </p:presentation>
 </file>
 
@@ -286,7 +302,7 @@
           <a:lstStyle/>
           <a:p>
             <a:fld id="{CCFC08D4-7C59-7242-9DBD-1BEFF16B1B8E}" type="datetimeFigureOut">
-              <a:t>7/13/18</a:t>
+              <a:t>02/08/21</a:t>
             </a:fld>
             <a:endParaRPr lang="en-US"/>
           </a:p>
@@ -452,7 +468,7 @@
           <a:lstStyle/>
           <a:p>
             <a:fld id="{CCFC08D4-7C59-7242-9DBD-1BEFF16B1B8E}" type="datetimeFigureOut">
-              <a:t>7/13/18</a:t>
+              <a:t>02/08/21</a:t>
             </a:fld>
             <a:endParaRPr lang="en-US"/>
           </a:p>
@@ -628,7 +644,7 @@
           <a:lstStyle/>
           <a:p>
             <a:fld id="{CCFC08D4-7C59-7242-9DBD-1BEFF16B1B8E}" type="datetimeFigureOut">
-              <a:t>7/13/18</a:t>
+              <a:t>02/08/21</a:t>
             </a:fld>
             <a:endParaRPr lang="en-US"/>
           </a:p>
@@ -794,7 +810,7 @@
           <a:lstStyle/>
           <a:p>
             <a:fld id="{CCFC08D4-7C59-7242-9DBD-1BEFF16B1B8E}" type="datetimeFigureOut">
-              <a:t>7/13/18</a:t>
+              <a:t>02/08/21</a:t>
             </a:fld>
             <a:endParaRPr lang="en-US"/>
           </a:p>
@@ -1037,7 +1053,7 @@
           <a:lstStyle/>
           <a:p>
             <a:fld id="{CCFC08D4-7C59-7242-9DBD-1BEFF16B1B8E}" type="datetimeFigureOut">
-              <a:t>7/13/18</a:t>
+              <a:t>02/08/21</a:t>
             </a:fld>
             <a:endParaRPr lang="en-US"/>
           </a:p>
@@ -1320,7 +1336,7 @@
           <a:lstStyle/>
           <a:p>
             <a:fld id="{CCFC08D4-7C59-7242-9DBD-1BEFF16B1B8E}" type="datetimeFigureOut">
-              <a:t>7/13/18</a:t>
+              <a:t>02/08/21</a:t>
             </a:fld>
             <a:endParaRPr lang="en-US"/>
           </a:p>
@@ -1737,7 +1753,7 @@
           <a:lstStyle/>
           <a:p>
             <a:fld id="{CCFC08D4-7C59-7242-9DBD-1BEFF16B1B8E}" type="datetimeFigureOut">
-              <a:t>7/13/18</a:t>
+              <a:t>02/08/21</a:t>
             </a:fld>
             <a:endParaRPr lang="en-US"/>
           </a:p>
@@ -1852,7 +1868,7 @@
           <a:lstStyle/>
           <a:p>
             <a:fld id="{CCFC08D4-7C59-7242-9DBD-1BEFF16B1B8E}" type="datetimeFigureOut">
-              <a:t>7/13/18</a:t>
+              <a:t>02/08/21</a:t>
             </a:fld>
             <a:endParaRPr lang="en-US"/>
           </a:p>
@@ -1945,7 +1961,7 @@
           <a:lstStyle/>
           <a:p>
             <a:fld id="{CCFC08D4-7C59-7242-9DBD-1BEFF16B1B8E}" type="datetimeFigureOut">
-              <a:t>7/13/18</a:t>
+              <a:t>02/08/21</a:t>
             </a:fld>
             <a:endParaRPr lang="en-US"/>
           </a:p>
@@ -2218,7 +2234,7 @@
           <a:lstStyle/>
           <a:p>
             <a:fld id="{CCFC08D4-7C59-7242-9DBD-1BEFF16B1B8E}" type="datetimeFigureOut">
-              <a:t>7/13/18</a:t>
+              <a:t>02/08/21</a:t>
             </a:fld>
             <a:endParaRPr lang="en-US"/>
           </a:p>
@@ -2468,7 +2484,7 @@
           <a:lstStyle/>
           <a:p>
             <a:fld id="{CCFC08D4-7C59-7242-9DBD-1BEFF16B1B8E}" type="datetimeFigureOut">
-              <a:t>7/13/18</a:t>
+              <a:t>02/08/21</a:t>
             </a:fld>
             <a:endParaRPr lang="en-US"/>
           </a:p>
@@ -2677,7 +2693,7 @@
           </a:lstStyle>
           <a:p>
             <a:fld id="{CCFC08D4-7C59-7242-9DBD-1BEFF16B1B8E}" type="datetimeFigureOut">
-              <a:t>7/13/18</a:t>
+              <a:t>02/08/21</a:t>
             </a:fld>
             <a:endParaRPr lang="en-US"/>
           </a:p>
@@ -5115,7 +5131,13 @@
       </p:sp>
       <p:pic>
         <p:nvPicPr>
-          <p:cNvPr id="10" name="Picture 9"/>
+          <p:cNvPr id="2" name="Picture 1">
+            <a:extLst>
+              <a:ext uri="{FF2B5EF4-FFF2-40B4-BE49-F238E27FC236}">
+                <a16:creationId xmlns:a16="http://schemas.microsoft.com/office/drawing/2014/main" id="{70A22A95-7B27-8B43-8CD9-67D8B14770CC}"/>
+              </a:ext>
+            </a:extLst>
+          </p:cNvPr>
           <p:cNvPicPr>
             <a:picLocks noChangeAspect="1"/>
           </p:cNvPicPr>
@@ -5129,8 +5151,8 @@
         </p:blipFill>
         <p:spPr>
           <a:xfrm>
-            <a:off x="1298360" y="5733299"/>
-            <a:ext cx="4114619" cy="2491273"/>
+            <a:off x="1596720" y="5771139"/>
+            <a:ext cx="3517900" cy="2019300"/>
           </a:xfrm>
           <a:prstGeom prst="rect">
             <a:avLst/>

</xml_diff>